<commit_message>
[FEATURE] adding presentation materials
</commit_message>
<xml_diff>
--- a/Project/topic-5.pptx
+++ b/Project/topic-5.pptx
@@ -5,7 +5,7 @@
     <p:sldMasterId id="2147483648" r:id="rId1"/>
   </p:sldMasterIdLst>
   <p:notesMasterIdLst>
-    <p:notesMasterId r:id="rId32"/>
+    <p:notesMasterId r:id="rId37"/>
   </p:notesMasterIdLst>
   <p:sldIdLst>
     <p:sldId id="256" r:id="rId2"/>
@@ -26,18 +26,23 @@
     <p:sldId id="290" r:id="rId17"/>
     <p:sldId id="269" r:id="rId18"/>
     <p:sldId id="291" r:id="rId19"/>
-    <p:sldId id="275" r:id="rId20"/>
-    <p:sldId id="271" r:id="rId21"/>
-    <p:sldId id="270" r:id="rId22"/>
-    <p:sldId id="259" r:id="rId23"/>
-    <p:sldId id="267" r:id="rId24"/>
-    <p:sldId id="261" r:id="rId25"/>
-    <p:sldId id="262" r:id="rId26"/>
-    <p:sldId id="263" r:id="rId27"/>
-    <p:sldId id="265" r:id="rId28"/>
-    <p:sldId id="266" r:id="rId29"/>
-    <p:sldId id="257" r:id="rId30"/>
-    <p:sldId id="258" r:id="rId31"/>
+    <p:sldId id="293" r:id="rId20"/>
+    <p:sldId id="292" r:id="rId21"/>
+    <p:sldId id="294" r:id="rId22"/>
+    <p:sldId id="295" r:id="rId23"/>
+    <p:sldId id="296" r:id="rId24"/>
+    <p:sldId id="275" r:id="rId25"/>
+    <p:sldId id="271" r:id="rId26"/>
+    <p:sldId id="270" r:id="rId27"/>
+    <p:sldId id="259" r:id="rId28"/>
+    <p:sldId id="267" r:id="rId29"/>
+    <p:sldId id="261" r:id="rId30"/>
+    <p:sldId id="262" r:id="rId31"/>
+    <p:sldId id="263" r:id="rId32"/>
+    <p:sldId id="265" r:id="rId33"/>
+    <p:sldId id="266" r:id="rId34"/>
+    <p:sldId id="257" r:id="rId35"/>
+    <p:sldId id="258" r:id="rId36"/>
   </p:sldIdLst>
   <p:sldSz cx="12192000" cy="6858000"/>
   <p:notesSz cx="6858000" cy="9144000"/>
@@ -9483,13 +9488,8 @@
             </a:r>
             <a:r>
               <a:rPr lang="en-US" sz="2600" dirty="0"/>
-              <a:t> cannot lower than </a:t>
-            </a:r>
-            <a:r>
-              <a:rPr lang="en-US" sz="2600"/>
-              <a:t>-0.03 </a:t>
-            </a:r>
-            <a:endParaRPr lang="en-US" sz="2600" dirty="0"/>
+              <a:t> cannot lower than -0.03 </a:t>
+            </a:r>
           </a:p>
           <a:p>
             <a:pPr lvl="1"/>
@@ -9523,6 +9523,1039 @@
 </file>
 
 <file path=ppt/slides/slide19.xml><?xml version="1.0" encoding="utf-8"?>
+<p:sld xmlns:a="http://schemas.openxmlformats.org/drawingml/2006/main" xmlns:r="http://schemas.openxmlformats.org/officeDocument/2006/relationships" xmlns:p="http://schemas.openxmlformats.org/presentationml/2006/main">
+  <p:cSld>
+    <p:spTree>
+      <p:nvGrpSpPr>
+        <p:cNvPr id="1" name=""/>
+        <p:cNvGrpSpPr/>
+        <p:nvPr/>
+      </p:nvGrpSpPr>
+      <p:grpSpPr>
+        <a:xfrm>
+          <a:off x="0" y="0"/>
+          <a:ext cx="0" cy="0"/>
+          <a:chOff x="0" y="0"/>
+          <a:chExt cx="0" cy="0"/>
+        </a:xfrm>
+      </p:grpSpPr>
+      <p:sp>
+        <p:nvSpPr>
+          <p:cNvPr id="2" name="Title 1">
+            <a:extLst>
+              <a:ext uri="{FF2B5EF4-FFF2-40B4-BE49-F238E27FC236}">
+                <a16:creationId xmlns:a16="http://schemas.microsoft.com/office/drawing/2014/main" id="{0F37EDC3-D9E0-D240-8974-F1550752738C}"/>
+              </a:ext>
+            </a:extLst>
+          </p:cNvPr>
+          <p:cNvSpPr>
+            <a:spLocks noGrp="1"/>
+          </p:cNvSpPr>
+          <p:nvPr>
+            <p:ph type="title"/>
+          </p:nvPr>
+        </p:nvSpPr>
+        <p:spPr/>
+        <p:txBody>
+          <a:bodyPr/>
+          <a:lstStyle/>
+          <a:p>
+            <a:r>
+              <a:rPr lang="en-TW" dirty="0"/>
+              <a:t>Linear Programming Formulation</a:t>
+            </a:r>
+          </a:p>
+        </p:txBody>
+      </p:sp>
+      <p:pic>
+        <p:nvPicPr>
+          <p:cNvPr id="5" name="Picture 4" descr="A screenshot of a cell phone&#10;&#10;Description automatically generated">
+            <a:extLst>
+              <a:ext uri="{FF2B5EF4-FFF2-40B4-BE49-F238E27FC236}">
+                <a16:creationId xmlns:a16="http://schemas.microsoft.com/office/drawing/2014/main" id="{F5A0E096-6EBF-BD41-B1D4-99721607A78D}"/>
+              </a:ext>
+            </a:extLst>
+          </p:cNvPr>
+          <p:cNvPicPr>
+            <a:picLocks noChangeAspect="1"/>
+          </p:cNvPicPr>
+          <p:nvPr/>
+        </p:nvPicPr>
+        <p:blipFill>
+          <a:blip r:embed="rId2"/>
+          <a:stretch>
+            <a:fillRect/>
+          </a:stretch>
+        </p:blipFill>
+        <p:spPr>
+          <a:xfrm>
+            <a:off x="6054418" y="2783680"/>
+            <a:ext cx="6137582" cy="2371725"/>
+          </a:xfrm>
+          <a:prstGeom prst="rect">
+            <a:avLst/>
+          </a:prstGeom>
+        </p:spPr>
+      </p:pic>
+      <p:pic>
+        <p:nvPicPr>
+          <p:cNvPr id="9" name="Picture 8" descr="A close up of text on a white background&#10;&#10;Description automatically generated">
+            <a:extLst>
+              <a:ext uri="{FF2B5EF4-FFF2-40B4-BE49-F238E27FC236}">
+                <a16:creationId xmlns:a16="http://schemas.microsoft.com/office/drawing/2014/main" id="{980E2818-EE19-D542-B721-E6A84489CE2B}"/>
+              </a:ext>
+            </a:extLst>
+          </p:cNvPr>
+          <p:cNvPicPr>
+            <a:picLocks noChangeAspect="1"/>
+          </p:cNvPicPr>
+          <p:nvPr/>
+        </p:nvPicPr>
+        <p:blipFill>
+          <a:blip r:embed="rId3"/>
+          <a:stretch>
+            <a:fillRect/>
+          </a:stretch>
+        </p:blipFill>
+        <p:spPr>
+          <a:xfrm>
+            <a:off x="226859" y="1619248"/>
+            <a:ext cx="5526723" cy="4629150"/>
+          </a:xfrm>
+          <a:prstGeom prst="rect">
+            <a:avLst/>
+          </a:prstGeom>
+        </p:spPr>
+      </p:pic>
+    </p:spTree>
+    <p:extLst>
+      <p:ext uri="{BB962C8B-B14F-4D97-AF65-F5344CB8AC3E}">
+        <p14:creationId xmlns:p14="http://schemas.microsoft.com/office/powerpoint/2010/main" val="591790995"/>
+      </p:ext>
+    </p:extLst>
+  </p:cSld>
+  <p:clrMapOvr>
+    <a:masterClrMapping/>
+  </p:clrMapOvr>
+</p:sld>
+</file>
+
+<file path=ppt/slides/slide2.xml><?xml version="1.0" encoding="utf-8"?>
+<p:sld xmlns:a="http://schemas.openxmlformats.org/drawingml/2006/main" xmlns:r="http://schemas.openxmlformats.org/officeDocument/2006/relationships" xmlns:p="http://schemas.openxmlformats.org/presentationml/2006/main">
+  <p:cSld>
+    <p:bg>
+      <p:bgPr>
+        <a:solidFill>
+          <a:schemeClr val="bg1">
+            <a:tint val="95000"/>
+            <a:satMod val="170000"/>
+          </a:schemeClr>
+        </a:solidFill>
+        <a:effectLst/>
+      </p:bgPr>
+    </p:bg>
+    <p:spTree>
+      <p:nvGrpSpPr>
+        <p:cNvPr id="1" name=""/>
+        <p:cNvGrpSpPr/>
+        <p:nvPr/>
+      </p:nvGrpSpPr>
+      <p:grpSpPr>
+        <a:xfrm>
+          <a:off x="0" y="0"/>
+          <a:ext cx="0" cy="0"/>
+          <a:chOff x="0" y="0"/>
+          <a:chExt cx="0" cy="0"/>
+        </a:xfrm>
+      </p:grpSpPr>
+      <p:sp>
+        <p:nvSpPr>
+          <p:cNvPr id="9" name="Rectangle 8">
+            <a:extLst>
+              <a:ext uri="{FF2B5EF4-FFF2-40B4-BE49-F238E27FC236}">
+                <a16:creationId xmlns:a16="http://schemas.microsoft.com/office/drawing/2014/main" id="{1E214AA7-F028-4A0D-8698-61AEC754D1BC}"/>
+              </a:ext>
+              <a:ext uri="{C183D7F6-B498-43B3-948B-1728B52AA6E4}">
+                <adec:decorative xmlns:adec="http://schemas.microsoft.com/office/drawing/2017/decorative" val="1"/>
+              </a:ext>
+            </a:extLst>
+          </p:cNvPr>
+          <p:cNvSpPr>
+            <a:spLocks noGrp="1" noRot="1" noChangeAspect="1" noMove="1" noResize="1" noEditPoints="1" noAdjustHandles="1" noChangeArrowheads="1" noChangeShapeType="1" noTextEdit="1"/>
+          </p:cNvSpPr>
+          <p:nvPr>
+            <p:extLst>
+              <p:ext uri="{386F3935-93C4-4BCD-93E2-E3B085C9AB24}">
+                <p16:designElem xmlns:p16="http://schemas.microsoft.com/office/powerpoint/2015/main" val="1"/>
+              </p:ext>
+            </p:extLst>
+          </p:nvPr>
+        </p:nvSpPr>
+        <p:spPr>
+          <a:xfrm>
+            <a:off x="0" y="1"/>
+            <a:ext cx="12192000" cy="1598340"/>
+          </a:xfrm>
+          <a:prstGeom prst="rect">
+            <a:avLst/>
+          </a:prstGeom>
+          <a:solidFill>
+            <a:srgbClr val="595959"/>
+          </a:solidFill>
+          <a:ln>
+            <a:noFill/>
+          </a:ln>
+        </p:spPr>
+        <p:style>
+          <a:lnRef idx="2">
+            <a:schemeClr val="accent1">
+              <a:shade val="50000"/>
+            </a:schemeClr>
+          </a:lnRef>
+          <a:fillRef idx="1">
+            <a:schemeClr val="accent1"/>
+          </a:fillRef>
+          <a:effectRef idx="0">
+            <a:schemeClr val="accent1"/>
+          </a:effectRef>
+          <a:fontRef idx="minor">
+            <a:schemeClr val="lt1"/>
+          </a:fontRef>
+        </p:style>
+        <p:txBody>
+          <a:bodyPr rtlCol="0" anchor="ctr"/>
+          <a:lstStyle/>
+          <a:p>
+            <a:pPr marL="0" marR="0" lvl="0" indent="0" algn="ctr" defTabSz="914400" rtl="0" eaLnBrk="1" fontAlgn="auto" latinLnBrk="0" hangingPunct="1">
+              <a:lnSpc>
+                <a:spcPct val="100000"/>
+              </a:lnSpc>
+              <a:spcBef>
+                <a:spcPts val="0"/>
+              </a:spcBef>
+              <a:spcAft>
+                <a:spcPts val="0"/>
+              </a:spcAft>
+              <a:buClrTx/>
+              <a:buSzTx/>
+              <a:buFontTx/>
+              <a:buNone/>
+              <a:tabLst/>
+              <a:defRPr/>
+            </a:pPr>
+            <a:endParaRPr kumimoji="0" lang="en-US" sz="1800" b="0" i="0" u="none" strike="noStrike" kern="1200" cap="none" spc="0" normalizeH="0" baseline="0" noProof="0">
+              <a:ln>
+                <a:noFill/>
+              </a:ln>
+              <a:solidFill>
+                <a:prstClr val="white"/>
+              </a:solidFill>
+              <a:effectLst/>
+              <a:uLnTx/>
+              <a:uFillTx/>
+              <a:latin typeface="Calibri" panose="020F0502020204030204"/>
+              <a:ea typeface="+mn-ea"/>
+              <a:cs typeface="+mn-cs"/>
+            </a:endParaRPr>
+          </a:p>
+        </p:txBody>
+      </p:sp>
+      <p:sp>
+        <p:nvSpPr>
+          <p:cNvPr id="2" name="Title 1">
+            <a:extLst>
+              <a:ext uri="{FF2B5EF4-FFF2-40B4-BE49-F238E27FC236}">
+                <a16:creationId xmlns:a16="http://schemas.microsoft.com/office/drawing/2014/main" id="{225D665C-BD78-F248-8E4B-011967D31C90}"/>
+              </a:ext>
+            </a:extLst>
+          </p:cNvPr>
+          <p:cNvSpPr>
+            <a:spLocks noGrp="1"/>
+          </p:cNvSpPr>
+          <p:nvPr>
+            <p:ph type="title"/>
+          </p:nvPr>
+        </p:nvSpPr>
+        <p:spPr>
+          <a:xfrm>
+            <a:off x="1159933" y="995318"/>
+            <a:ext cx="9872134" cy="1193968"/>
+          </a:xfrm>
+          <a:solidFill>
+            <a:srgbClr val="FFFFFF"/>
+          </a:solidFill>
+          <a:ln w="38100">
+            <a:solidFill>
+              <a:srgbClr val="7F7F7F"/>
+            </a:solidFill>
+            <a:miter lim="800000"/>
+          </a:ln>
+        </p:spPr>
+        <p:txBody>
+          <a:bodyPr>
+            <a:normAutofit/>
+          </a:bodyPr>
+          <a:lstStyle/>
+          <a:p>
+            <a:pPr algn="ctr"/>
+            <a:r>
+              <a:rPr lang="en-TW" sz="5000" dirty="0">
+                <a:solidFill>
+                  <a:srgbClr val="3F3F3F"/>
+                </a:solidFill>
+              </a:rPr>
+              <a:t>Agenda</a:t>
+            </a:r>
+          </a:p>
+        </p:txBody>
+      </p:sp>
+      <p:sp>
+        <p:nvSpPr>
+          <p:cNvPr id="3" name="Content Placeholder 2">
+            <a:extLst>
+              <a:ext uri="{FF2B5EF4-FFF2-40B4-BE49-F238E27FC236}">
+                <a16:creationId xmlns:a16="http://schemas.microsoft.com/office/drawing/2014/main" id="{1197C189-3036-CD4E-A1C2-E8FEA504BC89}"/>
+              </a:ext>
+            </a:extLst>
+          </p:cNvPr>
+          <p:cNvSpPr>
+            <a:spLocks noGrp="1"/>
+          </p:cNvSpPr>
+          <p:nvPr>
+            <p:ph sz="half" idx="1"/>
+          </p:nvPr>
+        </p:nvSpPr>
+        <p:spPr>
+          <a:xfrm>
+            <a:off x="1159933" y="2449286"/>
+            <a:ext cx="4936067" cy="4049485"/>
+          </a:xfrm>
+        </p:spPr>
+        <p:txBody>
+          <a:bodyPr anchor="t">
+            <a:noAutofit/>
+          </a:bodyPr>
+          <a:lstStyle/>
+          <a:p>
+            <a:pPr>
+              <a:lnSpc>
+                <a:spcPct val="100000"/>
+              </a:lnSpc>
+            </a:pPr>
+            <a:r>
+              <a:rPr lang="en-US" sz="3000" dirty="0"/>
+              <a:t>I</a:t>
+            </a:r>
+            <a:r>
+              <a:rPr lang="en-TW" sz="3000" dirty="0"/>
+              <a:t>ntroduction to Tabu Search</a:t>
+            </a:r>
+          </a:p>
+          <a:p>
+            <a:pPr lvl="1">
+              <a:lnSpc>
+                <a:spcPct val="100000"/>
+              </a:lnSpc>
+            </a:pPr>
+            <a:r>
+              <a:rPr lang="en-US" sz="2000" dirty="0"/>
+              <a:t>local and global optimum </a:t>
+            </a:r>
+          </a:p>
+          <a:p>
+            <a:pPr lvl="1">
+              <a:lnSpc>
+                <a:spcPct val="100000"/>
+              </a:lnSpc>
+            </a:pPr>
+            <a:r>
+              <a:rPr lang="en-US" sz="2000" dirty="0"/>
+              <a:t>exploration and exploitation</a:t>
+            </a:r>
+            <a:endParaRPr lang="en-TW" sz="2000" dirty="0"/>
+          </a:p>
+          <a:p>
+            <a:pPr lvl="1">
+              <a:lnSpc>
+                <a:spcPct val="100000"/>
+              </a:lnSpc>
+            </a:pPr>
+            <a:r>
+              <a:rPr lang="en-US" sz="2000" dirty="0"/>
+              <a:t>TS strategy</a:t>
+            </a:r>
+          </a:p>
+          <a:p>
+            <a:pPr lvl="1">
+              <a:lnSpc>
+                <a:spcPct val="100000"/>
+              </a:lnSpc>
+            </a:pPr>
+            <a:r>
+              <a:rPr lang="en-US" sz="2000" dirty="0"/>
+              <a:t>TS memory </a:t>
+            </a:r>
+          </a:p>
+          <a:p>
+            <a:pPr lvl="1">
+              <a:lnSpc>
+                <a:spcPct val="100000"/>
+              </a:lnSpc>
+            </a:pPr>
+            <a:r>
+              <a:rPr lang="en-US" sz="2000" dirty="0"/>
+              <a:t>stopping criteria</a:t>
+            </a:r>
+          </a:p>
+          <a:p>
+            <a:pPr>
+              <a:lnSpc>
+                <a:spcPct val="100000"/>
+              </a:lnSpc>
+            </a:pPr>
+            <a:r>
+              <a:rPr lang="en-TW" dirty="0"/>
+              <a:t>Simple Example of TS</a:t>
+            </a:r>
+          </a:p>
+          <a:p>
+            <a:pPr lvl="1">
+              <a:lnSpc>
+                <a:spcPct val="100000"/>
+              </a:lnSpc>
+            </a:pPr>
+            <a:r>
+              <a:rPr lang="en-US" sz="2000" dirty="0"/>
+              <a:t>applying TS on</a:t>
+            </a:r>
+            <a:r>
+              <a:rPr lang="en-TW" sz="2000" dirty="0"/>
+              <a:t> TSP problem</a:t>
+            </a:r>
+          </a:p>
+          <a:p>
+            <a:pPr lvl="1">
+              <a:lnSpc>
+                <a:spcPct val="100000"/>
+              </a:lnSpc>
+            </a:pPr>
+            <a:r>
+              <a:rPr lang="en-US" sz="2000" dirty="0"/>
+              <a:t>a</a:t>
+            </a:r>
+            <a:r>
+              <a:rPr lang="en-TW" sz="2000" dirty="0"/>
+              <a:t>dvantages and disadvantages</a:t>
+            </a:r>
+          </a:p>
+        </p:txBody>
+      </p:sp>
+      <p:cxnSp>
+        <p:nvCxnSpPr>
+          <p:cNvPr id="11" name="Straight Connector 10">
+            <a:extLst>
+              <a:ext uri="{FF2B5EF4-FFF2-40B4-BE49-F238E27FC236}">
+                <a16:creationId xmlns:a16="http://schemas.microsoft.com/office/drawing/2014/main" id="{D6206FDC-2777-4D7F-AF9C-73413DA664C9}"/>
+              </a:ext>
+              <a:ext uri="{C183D7F6-B498-43B3-948B-1728B52AA6E4}">
+                <adec:decorative xmlns:adec="http://schemas.microsoft.com/office/drawing/2017/decorative" val="1"/>
+              </a:ext>
+            </a:extLst>
+          </p:cNvPr>
+          <p:cNvCxnSpPr>
+            <a:cxnSpLocks noGrp="1" noRot="1" noChangeAspect="1" noMove="1" noResize="1" noEditPoints="1" noAdjustHandles="1" noChangeArrowheads="1" noChangeShapeType="1"/>
+          </p:cNvCxnSpPr>
+          <p:nvPr>
+            <p:extLst>
+              <p:ext uri="{386F3935-93C4-4BCD-93E2-E3B085C9AB24}">
+                <p16:designElem xmlns:p16="http://schemas.microsoft.com/office/powerpoint/2015/main" val="1"/>
+              </p:ext>
+            </p:extLst>
+          </p:nvPr>
+        </p:nvCxnSpPr>
+        <p:spPr>
+          <a:xfrm>
+            <a:off x="6096000" y="2888250"/>
+            <a:ext cx="0" cy="2769135"/>
+          </a:xfrm>
+          <a:prstGeom prst="line">
+            <a:avLst/>
+          </a:prstGeom>
+          <a:ln w="19050">
+            <a:solidFill>
+              <a:srgbClr val="7F7F7F"/>
+            </a:solidFill>
+          </a:ln>
+        </p:spPr>
+        <p:style>
+          <a:lnRef idx="1">
+            <a:schemeClr val="accent1"/>
+          </a:lnRef>
+          <a:fillRef idx="0">
+            <a:schemeClr val="accent1"/>
+          </a:fillRef>
+          <a:effectRef idx="0">
+            <a:schemeClr val="accent1"/>
+          </a:effectRef>
+          <a:fontRef idx="minor">
+            <a:schemeClr val="tx1"/>
+          </a:fontRef>
+        </p:style>
+      </p:cxnSp>
+      <p:sp>
+        <p:nvSpPr>
+          <p:cNvPr id="4" name="Content Placeholder 3">
+            <a:extLst>
+              <a:ext uri="{FF2B5EF4-FFF2-40B4-BE49-F238E27FC236}">
+                <a16:creationId xmlns:a16="http://schemas.microsoft.com/office/drawing/2014/main" id="{0ED8341E-74FA-014D-9844-ED7DDA97E204}"/>
+              </a:ext>
+            </a:extLst>
+          </p:cNvPr>
+          <p:cNvSpPr>
+            <a:spLocks noGrp="1"/>
+          </p:cNvSpPr>
+          <p:nvPr>
+            <p:ph sz="half" idx="2"/>
+          </p:nvPr>
+        </p:nvSpPr>
+        <p:spPr>
+          <a:xfrm>
+            <a:off x="6291942" y="2449285"/>
+            <a:ext cx="4740117" cy="4049485"/>
+          </a:xfrm>
+        </p:spPr>
+        <p:txBody>
+          <a:bodyPr anchor="t">
+            <a:normAutofit/>
+          </a:bodyPr>
+          <a:lstStyle/>
+          <a:p>
+            <a:pPr>
+              <a:lnSpc>
+                <a:spcPct val="100000"/>
+              </a:lnSpc>
+            </a:pPr>
+            <a:r>
+              <a:rPr lang="en-TW" sz="3000" dirty="0"/>
+              <a:t>Portfolio Optimization </a:t>
+            </a:r>
+          </a:p>
+          <a:p>
+            <a:pPr lvl="1">
+              <a:lnSpc>
+                <a:spcPct val="100000"/>
+              </a:lnSpc>
+            </a:pPr>
+            <a:r>
+              <a:rPr lang="en-US" sz="2000" dirty="0"/>
+              <a:t>Dataset</a:t>
+            </a:r>
+          </a:p>
+          <a:p>
+            <a:pPr lvl="1">
+              <a:lnSpc>
+                <a:spcPct val="100000"/>
+              </a:lnSpc>
+            </a:pPr>
+            <a:r>
+              <a:rPr lang="en-US" sz="2000" dirty="0"/>
+              <a:t>Constraints</a:t>
+            </a:r>
+          </a:p>
+          <a:p>
+            <a:pPr lvl="1">
+              <a:lnSpc>
+                <a:spcPct val="100000"/>
+              </a:lnSpc>
+            </a:pPr>
+            <a:r>
+              <a:rPr lang="en-US" sz="2000" dirty="0"/>
+              <a:t>Formulation</a:t>
+            </a:r>
+            <a:endParaRPr lang="en-TW" sz="2000" dirty="0"/>
+          </a:p>
+          <a:p>
+            <a:pPr>
+              <a:lnSpc>
+                <a:spcPct val="100000"/>
+              </a:lnSpc>
+            </a:pPr>
+            <a:r>
+              <a:rPr lang="en-TW" sz="3000" dirty="0"/>
+              <a:t>Experiment Results</a:t>
+            </a:r>
+          </a:p>
+          <a:p>
+            <a:pPr lvl="1">
+              <a:lnSpc>
+                <a:spcPct val="100000"/>
+              </a:lnSpc>
+            </a:pPr>
+            <a:r>
+              <a:rPr lang="en-US" sz="1600" dirty="0"/>
+              <a:t>TS result</a:t>
+            </a:r>
+          </a:p>
+          <a:p>
+            <a:pPr lvl="1">
+              <a:lnSpc>
+                <a:spcPct val="100000"/>
+              </a:lnSpc>
+            </a:pPr>
+            <a:r>
+              <a:rPr lang="en-US" sz="1600" dirty="0"/>
+              <a:t>grid search on parameters</a:t>
+            </a:r>
+          </a:p>
+          <a:p>
+            <a:pPr lvl="1">
+              <a:lnSpc>
+                <a:spcPct val="100000"/>
+              </a:lnSpc>
+            </a:pPr>
+            <a:r>
+              <a:rPr lang="en-US" sz="1600" dirty="0"/>
+              <a:t>comparison with S&amp;P 500 index and </a:t>
+            </a:r>
+            <a:r>
+              <a:rPr lang="en-US" sz="1600" dirty="0" err="1"/>
+              <a:t>Gurobi</a:t>
+            </a:r>
+            <a:r>
+              <a:rPr lang="en-US" sz="1600" dirty="0"/>
+              <a:t> performance</a:t>
+            </a:r>
+          </a:p>
+          <a:p>
+            <a:pPr marL="457200" lvl="1" indent="0">
+              <a:lnSpc>
+                <a:spcPct val="100000"/>
+              </a:lnSpc>
+              <a:buNone/>
+            </a:pPr>
+            <a:endParaRPr lang="en-TW" sz="1600" dirty="0"/>
+          </a:p>
+        </p:txBody>
+      </p:sp>
+    </p:spTree>
+    <p:extLst>
+      <p:ext uri="{BB962C8B-B14F-4D97-AF65-F5344CB8AC3E}">
+        <p14:creationId xmlns:p14="http://schemas.microsoft.com/office/powerpoint/2010/main" val="3551001927"/>
+      </p:ext>
+    </p:extLst>
+  </p:cSld>
+  <p:clrMapOvr>
+    <a:overrideClrMapping bg1="dk1" tx1="lt1" bg2="dk2" tx2="lt2" accent1="accent1" accent2="accent2" accent3="accent3" accent4="accent4" accent5="accent5" accent6="accent6" hlink="hlink" folHlink="folHlink"/>
+  </p:clrMapOvr>
+</p:sld>
+</file>
+
+<file path=ppt/slides/slide20.xml><?xml version="1.0" encoding="utf-8"?>
+<p:sld xmlns:a="http://schemas.openxmlformats.org/drawingml/2006/main" xmlns:r="http://schemas.openxmlformats.org/officeDocument/2006/relationships" xmlns:p="http://schemas.openxmlformats.org/presentationml/2006/main">
+  <p:cSld>
+    <p:spTree>
+      <p:nvGrpSpPr>
+        <p:cNvPr id="1" name=""/>
+        <p:cNvGrpSpPr/>
+        <p:nvPr/>
+      </p:nvGrpSpPr>
+      <p:grpSpPr>
+        <a:xfrm>
+          <a:off x="0" y="0"/>
+          <a:ext cx="0" cy="0"/>
+          <a:chOff x="0" y="0"/>
+          <a:chExt cx="0" cy="0"/>
+        </a:xfrm>
+      </p:grpSpPr>
+      <p:sp>
+        <p:nvSpPr>
+          <p:cNvPr id="2" name="Title 1">
+            <a:extLst>
+              <a:ext uri="{FF2B5EF4-FFF2-40B4-BE49-F238E27FC236}">
+                <a16:creationId xmlns:a16="http://schemas.microsoft.com/office/drawing/2014/main" id="{02BCD29F-1838-174F-965D-0DE83A1A39EA}"/>
+              </a:ext>
+            </a:extLst>
+          </p:cNvPr>
+          <p:cNvSpPr>
+            <a:spLocks noGrp="1"/>
+          </p:cNvSpPr>
+          <p:nvPr>
+            <p:ph type="title"/>
+          </p:nvPr>
+        </p:nvSpPr>
+        <p:spPr/>
+        <p:txBody>
+          <a:bodyPr/>
+          <a:lstStyle/>
+          <a:p>
+            <a:r>
+              <a:rPr lang="en-TW" dirty="0"/>
+              <a:t>Dataset</a:t>
+            </a:r>
+          </a:p>
+        </p:txBody>
+      </p:sp>
+      <p:sp>
+        <p:nvSpPr>
+          <p:cNvPr id="3" name="Content Placeholder 2">
+            <a:extLst>
+              <a:ext uri="{FF2B5EF4-FFF2-40B4-BE49-F238E27FC236}">
+                <a16:creationId xmlns:a16="http://schemas.microsoft.com/office/drawing/2014/main" id="{8664E499-313F-3245-9838-879A60F60D5D}"/>
+              </a:ext>
+            </a:extLst>
+          </p:cNvPr>
+          <p:cNvSpPr>
+            <a:spLocks noGrp="1"/>
+          </p:cNvSpPr>
+          <p:nvPr>
+            <p:ph idx="1"/>
+          </p:nvPr>
+        </p:nvSpPr>
+        <p:spPr/>
+        <p:txBody>
+          <a:bodyPr/>
+          <a:lstStyle/>
+          <a:p>
+            <a:r>
+              <a:rPr lang="en-US" dirty="0"/>
+              <a:t>S</a:t>
+            </a:r>
+            <a:r>
+              <a:rPr lang="en-TW" dirty="0"/>
+              <a:t>tocks List: S&amp;P 500 component stocks</a:t>
+            </a:r>
+          </a:p>
+          <a:p>
+            <a:r>
+              <a:rPr lang="en-US" dirty="0"/>
+              <a:t>Training </a:t>
+            </a:r>
+            <a:r>
+              <a:rPr lang="en-TW" dirty="0"/>
+              <a:t>period: 2016-01-01~2019-12-31</a:t>
+            </a:r>
+          </a:p>
+          <a:p>
+            <a:r>
+              <a:rPr lang="en-TW" dirty="0"/>
+              <a:t>Testing period: 2020-01-01~2020-04-16 (the huge drop is on 2020-02-21)</a:t>
+            </a:r>
+          </a:p>
+          <a:p>
+            <a:endParaRPr lang="en-TW" dirty="0"/>
+          </a:p>
+          <a:p>
+            <a:pPr marL="0" indent="0">
+              <a:buNone/>
+            </a:pPr>
+            <a:endParaRPr lang="en-TW" dirty="0"/>
+          </a:p>
+        </p:txBody>
+      </p:sp>
+    </p:spTree>
+    <p:extLst>
+      <p:ext uri="{BB962C8B-B14F-4D97-AF65-F5344CB8AC3E}">
+        <p14:creationId xmlns:p14="http://schemas.microsoft.com/office/powerpoint/2010/main" val="597381065"/>
+      </p:ext>
+    </p:extLst>
+  </p:cSld>
+  <p:clrMapOvr>
+    <a:masterClrMapping/>
+  </p:clrMapOvr>
+</p:sld>
+</file>
+
+<file path=ppt/slides/slide21.xml><?xml version="1.0" encoding="utf-8"?>
+<p:sld xmlns:a="http://schemas.openxmlformats.org/drawingml/2006/main" xmlns:r="http://schemas.openxmlformats.org/officeDocument/2006/relationships" xmlns:p="http://schemas.openxmlformats.org/presentationml/2006/main">
+  <p:cSld>
+    <p:spTree>
+      <p:nvGrpSpPr>
+        <p:cNvPr id="1" name=""/>
+        <p:cNvGrpSpPr/>
+        <p:nvPr/>
+      </p:nvGrpSpPr>
+      <p:grpSpPr>
+        <a:xfrm>
+          <a:off x="0" y="0"/>
+          <a:ext cx="0" cy="0"/>
+          <a:chOff x="0" y="0"/>
+          <a:chExt cx="0" cy="0"/>
+        </a:xfrm>
+      </p:grpSpPr>
+      <p:sp>
+        <p:nvSpPr>
+          <p:cNvPr id="2" name="Title 1">
+            <a:extLst>
+              <a:ext uri="{FF2B5EF4-FFF2-40B4-BE49-F238E27FC236}">
+                <a16:creationId xmlns:a16="http://schemas.microsoft.com/office/drawing/2014/main" id="{96AFAD97-4812-EF42-B31C-4BAD7E7D8DEB}"/>
+              </a:ext>
+            </a:extLst>
+          </p:cNvPr>
+          <p:cNvSpPr>
+            <a:spLocks noGrp="1"/>
+          </p:cNvSpPr>
+          <p:nvPr>
+            <p:ph type="title"/>
+          </p:nvPr>
+        </p:nvSpPr>
+        <p:spPr/>
+        <p:txBody>
+          <a:bodyPr/>
+          <a:lstStyle/>
+          <a:p>
+            <a:endParaRPr lang="en-TW"/>
+          </a:p>
+        </p:txBody>
+      </p:sp>
+      <p:sp>
+        <p:nvSpPr>
+          <p:cNvPr id="3" name="Content Placeholder 2">
+            <a:extLst>
+              <a:ext uri="{FF2B5EF4-FFF2-40B4-BE49-F238E27FC236}">
+                <a16:creationId xmlns:a16="http://schemas.microsoft.com/office/drawing/2014/main" id="{0E932B06-42AF-574B-A7B2-3B6C95EAB912}"/>
+              </a:ext>
+            </a:extLst>
+          </p:cNvPr>
+          <p:cNvSpPr>
+            <a:spLocks noGrp="1"/>
+          </p:cNvSpPr>
+          <p:nvPr>
+            <p:ph idx="1"/>
+          </p:nvPr>
+        </p:nvSpPr>
+        <p:spPr/>
+        <p:txBody>
+          <a:bodyPr/>
+          <a:lstStyle/>
+          <a:p>
+            <a:endParaRPr lang="en-TW"/>
+          </a:p>
+        </p:txBody>
+      </p:sp>
+      <p:pic>
+        <p:nvPicPr>
+          <p:cNvPr id="4" name="Picture 3">
+            <a:extLst>
+              <a:ext uri="{FF2B5EF4-FFF2-40B4-BE49-F238E27FC236}">
+                <a16:creationId xmlns:a16="http://schemas.microsoft.com/office/drawing/2014/main" id="{60202E08-9827-7A42-9F87-A6435A930FA1}"/>
+              </a:ext>
+            </a:extLst>
+          </p:cNvPr>
+          <p:cNvPicPr>
+            <a:picLocks noChangeAspect="1"/>
+          </p:cNvPicPr>
+          <p:nvPr/>
+        </p:nvPicPr>
+        <p:blipFill rotWithShape="1">
+          <a:blip r:embed="rId2"/>
+          <a:srcRect t="15000" r="13368"/>
+          <a:stretch/>
+        </p:blipFill>
+        <p:spPr>
+          <a:xfrm>
+            <a:off x="801973" y="365125"/>
+            <a:ext cx="10588053" cy="6492875"/>
+          </a:xfrm>
+          <a:prstGeom prst="rect">
+            <a:avLst/>
+          </a:prstGeom>
+        </p:spPr>
+      </p:pic>
+    </p:spTree>
+    <p:extLst>
+      <p:ext uri="{BB962C8B-B14F-4D97-AF65-F5344CB8AC3E}">
+        <p14:creationId xmlns:p14="http://schemas.microsoft.com/office/powerpoint/2010/main" val="1953066980"/>
+      </p:ext>
+    </p:extLst>
+  </p:cSld>
+  <p:clrMapOvr>
+    <a:masterClrMapping/>
+  </p:clrMapOvr>
+</p:sld>
+</file>
+
+<file path=ppt/slides/slide22.xml><?xml version="1.0" encoding="utf-8"?>
+<p:sld xmlns:a="http://schemas.openxmlformats.org/drawingml/2006/main" xmlns:r="http://schemas.openxmlformats.org/officeDocument/2006/relationships" xmlns:p="http://schemas.openxmlformats.org/presentationml/2006/main">
+  <p:cSld>
+    <p:spTree>
+      <p:nvGrpSpPr>
+        <p:cNvPr id="1" name=""/>
+        <p:cNvGrpSpPr/>
+        <p:nvPr/>
+      </p:nvGrpSpPr>
+      <p:grpSpPr>
+        <a:xfrm>
+          <a:off x="0" y="0"/>
+          <a:ext cx="0" cy="0"/>
+          <a:chOff x="0" y="0"/>
+          <a:chExt cx="0" cy="0"/>
+        </a:xfrm>
+      </p:grpSpPr>
+      <p:sp>
+        <p:nvSpPr>
+          <p:cNvPr id="2" name="Title 1">
+            <a:extLst>
+              <a:ext uri="{FF2B5EF4-FFF2-40B4-BE49-F238E27FC236}">
+                <a16:creationId xmlns:a16="http://schemas.microsoft.com/office/drawing/2014/main" id="{C3D6333C-B590-0248-9371-729F919935C1}"/>
+              </a:ext>
+            </a:extLst>
+          </p:cNvPr>
+          <p:cNvSpPr>
+            <a:spLocks noGrp="1"/>
+          </p:cNvSpPr>
+          <p:nvPr>
+            <p:ph type="title"/>
+          </p:nvPr>
+        </p:nvSpPr>
+        <p:spPr/>
+        <p:txBody>
+          <a:bodyPr/>
+          <a:lstStyle/>
+          <a:p>
+            <a:r>
+              <a:rPr lang="en-TW" dirty="0"/>
+              <a:t>Tabu Search Parameters</a:t>
+            </a:r>
+          </a:p>
+        </p:txBody>
+      </p:sp>
+      <p:sp>
+        <p:nvSpPr>
+          <p:cNvPr id="3" name="Content Placeholder 2">
+            <a:extLst>
+              <a:ext uri="{FF2B5EF4-FFF2-40B4-BE49-F238E27FC236}">
+                <a16:creationId xmlns:a16="http://schemas.microsoft.com/office/drawing/2014/main" id="{39E85A26-46A0-654B-9F4B-AA892756073B}"/>
+              </a:ext>
+            </a:extLst>
+          </p:cNvPr>
+          <p:cNvSpPr>
+            <a:spLocks noGrp="1"/>
+          </p:cNvSpPr>
+          <p:nvPr>
+            <p:ph idx="1"/>
+          </p:nvPr>
+        </p:nvSpPr>
+        <p:spPr/>
+        <p:txBody>
+          <a:bodyPr/>
+          <a:lstStyle/>
+          <a:p>
+            <a:endParaRPr lang="en-TW" dirty="0"/>
+          </a:p>
+        </p:txBody>
+      </p:sp>
+    </p:spTree>
+    <p:extLst>
+      <p:ext uri="{BB962C8B-B14F-4D97-AF65-F5344CB8AC3E}">
+        <p14:creationId xmlns:p14="http://schemas.microsoft.com/office/powerpoint/2010/main" val="2976253146"/>
+      </p:ext>
+    </p:extLst>
+  </p:cSld>
+  <p:clrMapOvr>
+    <a:masterClrMapping/>
+  </p:clrMapOvr>
+</p:sld>
+</file>
+
+<file path=ppt/slides/slide23.xml><?xml version="1.0" encoding="utf-8"?>
+<p:sld xmlns:a="http://schemas.openxmlformats.org/drawingml/2006/main" xmlns:r="http://schemas.openxmlformats.org/officeDocument/2006/relationships" xmlns:p="http://schemas.openxmlformats.org/presentationml/2006/main">
+  <p:cSld>
+    <p:spTree>
+      <p:nvGrpSpPr>
+        <p:cNvPr id="1" name=""/>
+        <p:cNvGrpSpPr/>
+        <p:nvPr/>
+      </p:nvGrpSpPr>
+      <p:grpSpPr>
+        <a:xfrm>
+          <a:off x="0" y="0"/>
+          <a:ext cx="0" cy="0"/>
+          <a:chOff x="0" y="0"/>
+          <a:chExt cx="0" cy="0"/>
+        </a:xfrm>
+      </p:grpSpPr>
+      <p:sp>
+        <p:nvSpPr>
+          <p:cNvPr id="2" name="Title 1">
+            <a:extLst>
+              <a:ext uri="{FF2B5EF4-FFF2-40B4-BE49-F238E27FC236}">
+                <a16:creationId xmlns:a16="http://schemas.microsoft.com/office/drawing/2014/main" id="{4D16ADF8-1B17-794E-99B4-5A2580B49762}"/>
+              </a:ext>
+            </a:extLst>
+          </p:cNvPr>
+          <p:cNvSpPr>
+            <a:spLocks noGrp="1"/>
+          </p:cNvSpPr>
+          <p:nvPr>
+            <p:ph type="title"/>
+          </p:nvPr>
+        </p:nvSpPr>
+        <p:spPr/>
+        <p:txBody>
+          <a:bodyPr/>
+          <a:lstStyle/>
+          <a:p>
+            <a:r>
+              <a:rPr lang="en-TW" dirty="0"/>
+              <a:t>Comparisons</a:t>
+            </a:r>
+          </a:p>
+        </p:txBody>
+      </p:sp>
+      <p:sp>
+        <p:nvSpPr>
+          <p:cNvPr id="3" name="Content Placeholder 2">
+            <a:extLst>
+              <a:ext uri="{FF2B5EF4-FFF2-40B4-BE49-F238E27FC236}">
+                <a16:creationId xmlns:a16="http://schemas.microsoft.com/office/drawing/2014/main" id="{9B4CD2D6-2901-234E-939F-B41AFC929413}"/>
+              </a:ext>
+            </a:extLst>
+          </p:cNvPr>
+          <p:cNvSpPr>
+            <a:spLocks noGrp="1"/>
+          </p:cNvSpPr>
+          <p:nvPr>
+            <p:ph idx="1"/>
+          </p:nvPr>
+        </p:nvSpPr>
+        <p:spPr/>
+        <p:txBody>
+          <a:bodyPr/>
+          <a:lstStyle/>
+          <a:p>
+            <a:r>
+              <a:rPr lang="en-TW" dirty="0"/>
+              <a:t>Gurobi</a:t>
+            </a:r>
+          </a:p>
+          <a:p>
+            <a:endParaRPr lang="en-TW" dirty="0"/>
+          </a:p>
+          <a:p>
+            <a:endParaRPr lang="en-TW" dirty="0"/>
+          </a:p>
+          <a:p>
+            <a:endParaRPr lang="en-TW" dirty="0"/>
+          </a:p>
+          <a:p>
+            <a:endParaRPr lang="en-TW" dirty="0"/>
+          </a:p>
+        </p:txBody>
+      </p:sp>
+    </p:spTree>
+    <p:extLst>
+      <p:ext uri="{BB962C8B-B14F-4D97-AF65-F5344CB8AC3E}">
+        <p14:creationId xmlns:p14="http://schemas.microsoft.com/office/powerpoint/2010/main" val="2280902913"/>
+      </p:ext>
+    </p:extLst>
+  </p:cSld>
+  <p:clrMapOvr>
+    <a:masterClrMapping/>
+  </p:clrMapOvr>
+</p:sld>
+</file>
+
+<file path=ppt/slides/slide24.xml><?xml version="1.0" encoding="utf-8"?>
 <p:sld xmlns:a="http://schemas.openxmlformats.org/drawingml/2006/main" xmlns:r="http://schemas.openxmlformats.org/officeDocument/2006/relationships" xmlns:p="http://schemas.openxmlformats.org/presentationml/2006/main">
   <p:cSld>
     <p:bg>
@@ -9938,517 +10971,7 @@
 </p:sld>
 </file>
 
-<file path=ppt/slides/slide2.xml><?xml version="1.0" encoding="utf-8"?>
-<p:sld xmlns:a="http://schemas.openxmlformats.org/drawingml/2006/main" xmlns:r="http://schemas.openxmlformats.org/officeDocument/2006/relationships" xmlns:p="http://schemas.openxmlformats.org/presentationml/2006/main">
-  <p:cSld>
-    <p:bg>
-      <p:bgPr>
-        <a:solidFill>
-          <a:schemeClr val="bg1">
-            <a:tint val="95000"/>
-            <a:satMod val="170000"/>
-          </a:schemeClr>
-        </a:solidFill>
-        <a:effectLst/>
-      </p:bgPr>
-    </p:bg>
-    <p:spTree>
-      <p:nvGrpSpPr>
-        <p:cNvPr id="1" name=""/>
-        <p:cNvGrpSpPr/>
-        <p:nvPr/>
-      </p:nvGrpSpPr>
-      <p:grpSpPr>
-        <a:xfrm>
-          <a:off x="0" y="0"/>
-          <a:ext cx="0" cy="0"/>
-          <a:chOff x="0" y="0"/>
-          <a:chExt cx="0" cy="0"/>
-        </a:xfrm>
-      </p:grpSpPr>
-      <p:sp>
-        <p:nvSpPr>
-          <p:cNvPr id="9" name="Rectangle 8">
-            <a:extLst>
-              <a:ext uri="{FF2B5EF4-FFF2-40B4-BE49-F238E27FC236}">
-                <a16:creationId xmlns:a16="http://schemas.microsoft.com/office/drawing/2014/main" id="{1E214AA7-F028-4A0D-8698-61AEC754D1BC}"/>
-              </a:ext>
-              <a:ext uri="{C183D7F6-B498-43B3-948B-1728B52AA6E4}">
-                <adec:decorative xmlns:adec="http://schemas.microsoft.com/office/drawing/2017/decorative" val="1"/>
-              </a:ext>
-            </a:extLst>
-          </p:cNvPr>
-          <p:cNvSpPr>
-            <a:spLocks noGrp="1" noRot="1" noChangeAspect="1" noMove="1" noResize="1" noEditPoints="1" noAdjustHandles="1" noChangeArrowheads="1" noChangeShapeType="1" noTextEdit="1"/>
-          </p:cNvSpPr>
-          <p:nvPr>
-            <p:extLst>
-              <p:ext uri="{386F3935-93C4-4BCD-93E2-E3B085C9AB24}">
-                <p16:designElem xmlns:p16="http://schemas.microsoft.com/office/powerpoint/2015/main" val="1"/>
-              </p:ext>
-            </p:extLst>
-          </p:nvPr>
-        </p:nvSpPr>
-        <p:spPr>
-          <a:xfrm>
-            <a:off x="0" y="1"/>
-            <a:ext cx="12192000" cy="1598340"/>
-          </a:xfrm>
-          <a:prstGeom prst="rect">
-            <a:avLst/>
-          </a:prstGeom>
-          <a:solidFill>
-            <a:srgbClr val="595959"/>
-          </a:solidFill>
-          <a:ln>
-            <a:noFill/>
-          </a:ln>
-        </p:spPr>
-        <p:style>
-          <a:lnRef idx="2">
-            <a:schemeClr val="accent1">
-              <a:shade val="50000"/>
-            </a:schemeClr>
-          </a:lnRef>
-          <a:fillRef idx="1">
-            <a:schemeClr val="accent1"/>
-          </a:fillRef>
-          <a:effectRef idx="0">
-            <a:schemeClr val="accent1"/>
-          </a:effectRef>
-          <a:fontRef idx="minor">
-            <a:schemeClr val="lt1"/>
-          </a:fontRef>
-        </p:style>
-        <p:txBody>
-          <a:bodyPr rtlCol="0" anchor="ctr"/>
-          <a:lstStyle/>
-          <a:p>
-            <a:pPr marL="0" marR="0" lvl="0" indent="0" algn="ctr" defTabSz="914400" rtl="0" eaLnBrk="1" fontAlgn="auto" latinLnBrk="0" hangingPunct="1">
-              <a:lnSpc>
-                <a:spcPct val="100000"/>
-              </a:lnSpc>
-              <a:spcBef>
-                <a:spcPts val="0"/>
-              </a:spcBef>
-              <a:spcAft>
-                <a:spcPts val="0"/>
-              </a:spcAft>
-              <a:buClrTx/>
-              <a:buSzTx/>
-              <a:buFontTx/>
-              <a:buNone/>
-              <a:tabLst/>
-              <a:defRPr/>
-            </a:pPr>
-            <a:endParaRPr kumimoji="0" lang="en-US" sz="1800" b="0" i="0" u="none" strike="noStrike" kern="1200" cap="none" spc="0" normalizeH="0" baseline="0" noProof="0">
-              <a:ln>
-                <a:noFill/>
-              </a:ln>
-              <a:solidFill>
-                <a:prstClr val="white"/>
-              </a:solidFill>
-              <a:effectLst/>
-              <a:uLnTx/>
-              <a:uFillTx/>
-              <a:latin typeface="Calibri" panose="020F0502020204030204"/>
-              <a:ea typeface="+mn-ea"/>
-              <a:cs typeface="+mn-cs"/>
-            </a:endParaRPr>
-          </a:p>
-        </p:txBody>
-      </p:sp>
-      <p:sp>
-        <p:nvSpPr>
-          <p:cNvPr id="2" name="Title 1">
-            <a:extLst>
-              <a:ext uri="{FF2B5EF4-FFF2-40B4-BE49-F238E27FC236}">
-                <a16:creationId xmlns:a16="http://schemas.microsoft.com/office/drawing/2014/main" id="{225D665C-BD78-F248-8E4B-011967D31C90}"/>
-              </a:ext>
-            </a:extLst>
-          </p:cNvPr>
-          <p:cNvSpPr>
-            <a:spLocks noGrp="1"/>
-          </p:cNvSpPr>
-          <p:nvPr>
-            <p:ph type="title"/>
-          </p:nvPr>
-        </p:nvSpPr>
-        <p:spPr>
-          <a:xfrm>
-            <a:off x="1159933" y="995318"/>
-            <a:ext cx="9872134" cy="1193968"/>
-          </a:xfrm>
-          <a:solidFill>
-            <a:srgbClr val="FFFFFF"/>
-          </a:solidFill>
-          <a:ln w="38100">
-            <a:solidFill>
-              <a:srgbClr val="7F7F7F"/>
-            </a:solidFill>
-            <a:miter lim="800000"/>
-          </a:ln>
-        </p:spPr>
-        <p:txBody>
-          <a:bodyPr>
-            <a:normAutofit/>
-          </a:bodyPr>
-          <a:lstStyle/>
-          <a:p>
-            <a:pPr algn="ctr"/>
-            <a:r>
-              <a:rPr lang="en-TW" sz="5000" dirty="0">
-                <a:solidFill>
-                  <a:srgbClr val="3F3F3F"/>
-                </a:solidFill>
-              </a:rPr>
-              <a:t>Agenda</a:t>
-            </a:r>
-          </a:p>
-        </p:txBody>
-      </p:sp>
-      <p:sp>
-        <p:nvSpPr>
-          <p:cNvPr id="3" name="Content Placeholder 2">
-            <a:extLst>
-              <a:ext uri="{FF2B5EF4-FFF2-40B4-BE49-F238E27FC236}">
-                <a16:creationId xmlns:a16="http://schemas.microsoft.com/office/drawing/2014/main" id="{1197C189-3036-CD4E-A1C2-E8FEA504BC89}"/>
-              </a:ext>
-            </a:extLst>
-          </p:cNvPr>
-          <p:cNvSpPr>
-            <a:spLocks noGrp="1"/>
-          </p:cNvSpPr>
-          <p:nvPr>
-            <p:ph sz="half" idx="1"/>
-          </p:nvPr>
-        </p:nvSpPr>
-        <p:spPr>
-          <a:xfrm>
-            <a:off x="1159933" y="2449286"/>
-            <a:ext cx="4936067" cy="4049485"/>
-          </a:xfrm>
-        </p:spPr>
-        <p:txBody>
-          <a:bodyPr anchor="t">
-            <a:noAutofit/>
-          </a:bodyPr>
-          <a:lstStyle/>
-          <a:p>
-            <a:pPr>
-              <a:lnSpc>
-                <a:spcPct val="100000"/>
-              </a:lnSpc>
-            </a:pPr>
-            <a:r>
-              <a:rPr lang="en-US" sz="3000" dirty="0"/>
-              <a:t>I</a:t>
-            </a:r>
-            <a:r>
-              <a:rPr lang="en-TW" sz="3000" dirty="0"/>
-              <a:t>ntroduction to Tabu Search</a:t>
-            </a:r>
-          </a:p>
-          <a:p>
-            <a:pPr lvl="1">
-              <a:lnSpc>
-                <a:spcPct val="100000"/>
-              </a:lnSpc>
-            </a:pPr>
-            <a:r>
-              <a:rPr lang="en-US" sz="2000" dirty="0"/>
-              <a:t>local and global optimum </a:t>
-            </a:r>
-          </a:p>
-          <a:p>
-            <a:pPr lvl="1">
-              <a:lnSpc>
-                <a:spcPct val="100000"/>
-              </a:lnSpc>
-            </a:pPr>
-            <a:r>
-              <a:rPr lang="en-US" sz="2000" dirty="0"/>
-              <a:t>exploration and exploitation</a:t>
-            </a:r>
-            <a:endParaRPr lang="en-TW" sz="2000" dirty="0"/>
-          </a:p>
-          <a:p>
-            <a:pPr lvl="1">
-              <a:lnSpc>
-                <a:spcPct val="100000"/>
-              </a:lnSpc>
-            </a:pPr>
-            <a:r>
-              <a:rPr lang="en-US" sz="2000" dirty="0"/>
-              <a:t>TS strategy</a:t>
-            </a:r>
-          </a:p>
-          <a:p>
-            <a:pPr lvl="1">
-              <a:lnSpc>
-                <a:spcPct val="100000"/>
-              </a:lnSpc>
-            </a:pPr>
-            <a:r>
-              <a:rPr lang="en-US" sz="2000" dirty="0"/>
-              <a:t>TS memory </a:t>
-            </a:r>
-          </a:p>
-          <a:p>
-            <a:pPr lvl="1">
-              <a:lnSpc>
-                <a:spcPct val="100000"/>
-              </a:lnSpc>
-            </a:pPr>
-            <a:r>
-              <a:rPr lang="en-US" sz="2000" dirty="0"/>
-              <a:t>stopping criteria</a:t>
-            </a:r>
-          </a:p>
-          <a:p>
-            <a:pPr>
-              <a:lnSpc>
-                <a:spcPct val="100000"/>
-              </a:lnSpc>
-            </a:pPr>
-            <a:r>
-              <a:rPr lang="en-TW" dirty="0"/>
-              <a:t>Simple Example of TS</a:t>
-            </a:r>
-          </a:p>
-          <a:p>
-            <a:pPr lvl="1">
-              <a:lnSpc>
-                <a:spcPct val="100000"/>
-              </a:lnSpc>
-            </a:pPr>
-            <a:r>
-              <a:rPr lang="en-US" sz="2000" dirty="0"/>
-              <a:t>applying TS on</a:t>
-            </a:r>
-            <a:r>
-              <a:rPr lang="en-TW" sz="2000" dirty="0"/>
-              <a:t> TSP problem</a:t>
-            </a:r>
-          </a:p>
-          <a:p>
-            <a:pPr lvl="1">
-              <a:lnSpc>
-                <a:spcPct val="100000"/>
-              </a:lnSpc>
-            </a:pPr>
-            <a:r>
-              <a:rPr lang="en-US" sz="2000" dirty="0"/>
-              <a:t>a</a:t>
-            </a:r>
-            <a:r>
-              <a:rPr lang="en-TW" sz="2000" dirty="0"/>
-              <a:t>dvantages and disadvantages</a:t>
-            </a:r>
-          </a:p>
-        </p:txBody>
-      </p:sp>
-      <p:cxnSp>
-        <p:nvCxnSpPr>
-          <p:cNvPr id="11" name="Straight Connector 10">
-            <a:extLst>
-              <a:ext uri="{FF2B5EF4-FFF2-40B4-BE49-F238E27FC236}">
-                <a16:creationId xmlns:a16="http://schemas.microsoft.com/office/drawing/2014/main" id="{D6206FDC-2777-4D7F-AF9C-73413DA664C9}"/>
-              </a:ext>
-              <a:ext uri="{C183D7F6-B498-43B3-948B-1728B52AA6E4}">
-                <adec:decorative xmlns:adec="http://schemas.microsoft.com/office/drawing/2017/decorative" val="1"/>
-              </a:ext>
-            </a:extLst>
-          </p:cNvPr>
-          <p:cNvCxnSpPr>
-            <a:cxnSpLocks noGrp="1" noRot="1" noChangeAspect="1" noMove="1" noResize="1" noEditPoints="1" noAdjustHandles="1" noChangeArrowheads="1" noChangeShapeType="1"/>
-          </p:cNvCxnSpPr>
-          <p:nvPr>
-            <p:extLst>
-              <p:ext uri="{386F3935-93C4-4BCD-93E2-E3B085C9AB24}">
-                <p16:designElem xmlns:p16="http://schemas.microsoft.com/office/powerpoint/2015/main" val="1"/>
-              </p:ext>
-            </p:extLst>
-          </p:nvPr>
-        </p:nvCxnSpPr>
-        <p:spPr>
-          <a:xfrm>
-            <a:off x="6096000" y="2888250"/>
-            <a:ext cx="0" cy="2769135"/>
-          </a:xfrm>
-          <a:prstGeom prst="line">
-            <a:avLst/>
-          </a:prstGeom>
-          <a:ln w="19050">
-            <a:solidFill>
-              <a:srgbClr val="7F7F7F"/>
-            </a:solidFill>
-          </a:ln>
-        </p:spPr>
-        <p:style>
-          <a:lnRef idx="1">
-            <a:schemeClr val="accent1"/>
-          </a:lnRef>
-          <a:fillRef idx="0">
-            <a:schemeClr val="accent1"/>
-          </a:fillRef>
-          <a:effectRef idx="0">
-            <a:schemeClr val="accent1"/>
-          </a:effectRef>
-          <a:fontRef idx="minor">
-            <a:schemeClr val="tx1"/>
-          </a:fontRef>
-        </p:style>
-      </p:cxnSp>
-      <p:sp>
-        <p:nvSpPr>
-          <p:cNvPr id="4" name="Content Placeholder 3">
-            <a:extLst>
-              <a:ext uri="{FF2B5EF4-FFF2-40B4-BE49-F238E27FC236}">
-                <a16:creationId xmlns:a16="http://schemas.microsoft.com/office/drawing/2014/main" id="{0ED8341E-74FA-014D-9844-ED7DDA97E204}"/>
-              </a:ext>
-            </a:extLst>
-          </p:cNvPr>
-          <p:cNvSpPr>
-            <a:spLocks noGrp="1"/>
-          </p:cNvSpPr>
-          <p:nvPr>
-            <p:ph sz="half" idx="2"/>
-          </p:nvPr>
-        </p:nvSpPr>
-        <p:spPr>
-          <a:xfrm>
-            <a:off x="6291942" y="2449285"/>
-            <a:ext cx="4740117" cy="4049485"/>
-          </a:xfrm>
-        </p:spPr>
-        <p:txBody>
-          <a:bodyPr anchor="t">
-            <a:normAutofit/>
-          </a:bodyPr>
-          <a:lstStyle/>
-          <a:p>
-            <a:pPr>
-              <a:lnSpc>
-                <a:spcPct val="100000"/>
-              </a:lnSpc>
-            </a:pPr>
-            <a:r>
-              <a:rPr lang="en-TW" sz="3000" dirty="0"/>
-              <a:t>Portfolio Optimization </a:t>
-            </a:r>
-          </a:p>
-          <a:p>
-            <a:pPr lvl="1">
-              <a:lnSpc>
-                <a:spcPct val="100000"/>
-              </a:lnSpc>
-            </a:pPr>
-            <a:r>
-              <a:rPr lang="en-US" sz="2000" dirty="0"/>
-              <a:t>Dataset</a:t>
-            </a:r>
-          </a:p>
-          <a:p>
-            <a:pPr lvl="1">
-              <a:lnSpc>
-                <a:spcPct val="100000"/>
-              </a:lnSpc>
-            </a:pPr>
-            <a:r>
-              <a:rPr lang="en-US" sz="2000" dirty="0"/>
-              <a:t>Constraints</a:t>
-            </a:r>
-          </a:p>
-          <a:p>
-            <a:pPr lvl="1">
-              <a:lnSpc>
-                <a:spcPct val="100000"/>
-              </a:lnSpc>
-            </a:pPr>
-            <a:r>
-              <a:rPr lang="en-US" sz="2000" dirty="0"/>
-              <a:t>Formulation</a:t>
-            </a:r>
-            <a:endParaRPr lang="en-TW" sz="2000" dirty="0"/>
-          </a:p>
-          <a:p>
-            <a:pPr>
-              <a:lnSpc>
-                <a:spcPct val="100000"/>
-              </a:lnSpc>
-            </a:pPr>
-            <a:r>
-              <a:rPr lang="en-TW" sz="3000" dirty="0"/>
-              <a:t>Experiment Results</a:t>
-            </a:r>
-          </a:p>
-          <a:p>
-            <a:pPr lvl="1">
-              <a:lnSpc>
-                <a:spcPct val="100000"/>
-              </a:lnSpc>
-            </a:pPr>
-            <a:r>
-              <a:rPr lang="en-US" sz="1600" dirty="0"/>
-              <a:t>TS result</a:t>
-            </a:r>
-          </a:p>
-          <a:p>
-            <a:pPr lvl="1">
-              <a:lnSpc>
-                <a:spcPct val="100000"/>
-              </a:lnSpc>
-            </a:pPr>
-            <a:r>
-              <a:rPr lang="en-US" sz="1600" dirty="0"/>
-              <a:t>grid search on parameters</a:t>
-            </a:r>
-          </a:p>
-          <a:p>
-            <a:pPr lvl="1">
-              <a:lnSpc>
-                <a:spcPct val="100000"/>
-              </a:lnSpc>
-            </a:pPr>
-            <a:r>
-              <a:rPr lang="en-US" sz="1600" dirty="0"/>
-              <a:t>comparison with S&amp;P 500 index and </a:t>
-            </a:r>
-            <a:r>
-              <a:rPr lang="en-US" sz="1600" dirty="0" err="1"/>
-              <a:t>Gurobi</a:t>
-            </a:r>
-            <a:r>
-              <a:rPr lang="en-US" sz="1600" dirty="0"/>
-              <a:t> performance</a:t>
-            </a:r>
-          </a:p>
-          <a:p>
-            <a:pPr marL="457200" lvl="1" indent="0">
-              <a:lnSpc>
-                <a:spcPct val="100000"/>
-              </a:lnSpc>
-              <a:buNone/>
-            </a:pPr>
-            <a:endParaRPr lang="en-TW" sz="1600" dirty="0"/>
-          </a:p>
-        </p:txBody>
-      </p:sp>
-    </p:spTree>
-    <p:extLst>
-      <p:ext uri="{BB962C8B-B14F-4D97-AF65-F5344CB8AC3E}">
-        <p14:creationId xmlns:p14="http://schemas.microsoft.com/office/powerpoint/2010/main" val="3551001927"/>
-      </p:ext>
-    </p:extLst>
-  </p:cSld>
-  <p:clrMapOvr>
-    <a:overrideClrMapping bg1="dk1" tx1="lt1" bg2="dk2" tx2="lt2" accent1="accent1" accent2="accent2" accent3="accent3" accent4="accent4" accent5="accent5" accent6="accent6" hlink="hlink" folHlink="folHlink"/>
-  </p:clrMapOvr>
-</p:sld>
-</file>
-
-<file path=ppt/slides/slide20.xml><?xml version="1.0" encoding="utf-8"?>
+<file path=ppt/slides/slide25.xml><?xml version="1.0" encoding="utf-8"?>
 <p:sld xmlns:a="http://schemas.openxmlformats.org/drawingml/2006/main" xmlns:r="http://schemas.openxmlformats.org/officeDocument/2006/relationships" xmlns:p="http://schemas.openxmlformats.org/presentationml/2006/main">
   <p:cSld>
     <p:bg>
@@ -10924,7 +11447,7 @@
 </p:sld>
 </file>
 
-<file path=ppt/slides/slide21.xml><?xml version="1.0" encoding="utf-8"?>
+<file path=ppt/slides/slide26.xml><?xml version="1.0" encoding="utf-8"?>
 <p:sld xmlns:a="http://schemas.openxmlformats.org/drawingml/2006/main" xmlns:r="http://schemas.openxmlformats.org/officeDocument/2006/relationships" xmlns:p="http://schemas.openxmlformats.org/presentationml/2006/main">
   <p:cSld>
     <p:bg>
@@ -11261,7 +11784,7 @@
 </p:sld>
 </file>
 
-<file path=ppt/slides/slide22.xml><?xml version="1.0" encoding="utf-8"?>
+<file path=ppt/slides/slide27.xml><?xml version="1.0" encoding="utf-8"?>
 <p:sld xmlns:a="http://schemas.openxmlformats.org/drawingml/2006/main" xmlns:r="http://schemas.openxmlformats.org/officeDocument/2006/relationships" xmlns:p="http://schemas.openxmlformats.org/presentationml/2006/main">
   <p:cSld>
     <p:bg>
@@ -11550,7 +12073,7 @@
 </p:sld>
 </file>
 
-<file path=ppt/slides/slide23.xml><?xml version="1.0" encoding="utf-8"?>
+<file path=ppt/slides/slide28.xml><?xml version="1.0" encoding="utf-8"?>
 <p:sld xmlns:a="http://schemas.openxmlformats.org/drawingml/2006/main" xmlns:r="http://schemas.openxmlformats.org/officeDocument/2006/relationships" xmlns:p="http://schemas.openxmlformats.org/presentationml/2006/main">
   <p:cSld>
     <p:spTree>
@@ -11762,7 +12285,7 @@
 </p:sld>
 </file>
 
-<file path=ppt/slides/slide24.xml><?xml version="1.0" encoding="utf-8"?>
+<file path=ppt/slides/slide29.xml><?xml version="1.0" encoding="utf-8"?>
 <p:sld xmlns:a="http://schemas.openxmlformats.org/drawingml/2006/main" xmlns:r="http://schemas.openxmlformats.org/officeDocument/2006/relationships" xmlns:p="http://schemas.openxmlformats.org/presentationml/2006/main">
   <p:cSld>
     <p:bg>
@@ -12133,7 +12656,344 @@
 </p:sld>
 </file>
 
-<file path=ppt/slides/slide25.xml><?xml version="1.0" encoding="utf-8"?>
+<file path=ppt/slides/slide3.xml><?xml version="1.0" encoding="utf-8"?>
+<p:sld xmlns:a="http://schemas.openxmlformats.org/drawingml/2006/main" xmlns:r="http://schemas.openxmlformats.org/officeDocument/2006/relationships" xmlns:p="http://schemas.openxmlformats.org/presentationml/2006/main">
+  <p:cSld>
+    <p:bg>
+      <p:bgPr>
+        <a:solidFill>
+          <a:schemeClr val="bg1">
+            <a:tint val="95000"/>
+            <a:satMod val="170000"/>
+          </a:schemeClr>
+        </a:solidFill>
+        <a:effectLst/>
+      </p:bgPr>
+    </p:bg>
+    <p:spTree>
+      <p:nvGrpSpPr>
+        <p:cNvPr id="1" name=""/>
+        <p:cNvGrpSpPr/>
+        <p:nvPr/>
+      </p:nvGrpSpPr>
+      <p:grpSpPr>
+        <a:xfrm>
+          <a:off x="0" y="0"/>
+          <a:ext cx="0" cy="0"/>
+          <a:chOff x="0" y="0"/>
+          <a:chExt cx="0" cy="0"/>
+        </a:xfrm>
+      </p:grpSpPr>
+      <p:sp>
+        <p:nvSpPr>
+          <p:cNvPr id="8" name="Freeform: Shape 7">
+            <a:extLst>
+              <a:ext uri="{FF2B5EF4-FFF2-40B4-BE49-F238E27FC236}">
+                <a16:creationId xmlns:a16="http://schemas.microsoft.com/office/drawing/2014/main" id="{DFF2AC85-FAA0-4844-813F-83C04D7382E2}"/>
+              </a:ext>
+              <a:ext uri="{C183D7F6-B498-43B3-948B-1728B52AA6E4}">
+                <adec:decorative xmlns:adec="http://schemas.microsoft.com/office/drawing/2017/decorative" val="1"/>
+              </a:ext>
+            </a:extLst>
+          </p:cNvPr>
+          <p:cNvSpPr>
+            <a:spLocks noGrp="1" noRot="1" noChangeAspect="1" noMove="1" noResize="1" noEditPoints="1" noAdjustHandles="1" noChangeArrowheads="1" noChangeShapeType="1" noTextEdit="1"/>
+          </p:cNvSpPr>
+          <p:nvPr>
+            <p:extLst>
+              <p:ext uri="{386F3935-93C4-4BCD-93E2-E3B085C9AB24}">
+                <p16:designElem xmlns:p16="http://schemas.microsoft.com/office/powerpoint/2015/main" val="1"/>
+              </p:ext>
+            </p:extLst>
+          </p:nvPr>
+        </p:nvSpPr>
+        <p:spPr>
+          <a:xfrm>
+            <a:off x="4907636" y="0"/>
+            <a:ext cx="7281316" cy="6858000"/>
+          </a:xfrm>
+          <a:custGeom>
+            <a:avLst/>
+            <a:gdLst>
+              <a:gd name="connsiteX0" fmla="*/ 361354 w 7281316"/>
+              <a:gd name="connsiteY0" fmla="*/ 0 h 6858000"/>
+              <a:gd name="connsiteX1" fmla="*/ 7281316 w 7281316"/>
+              <a:gd name="connsiteY1" fmla="*/ 0 h 6858000"/>
+              <a:gd name="connsiteX2" fmla="*/ 7281316 w 7281316"/>
+              <a:gd name="connsiteY2" fmla="*/ 6858000 h 6858000"/>
+              <a:gd name="connsiteX3" fmla="*/ 696735 w 7281316"/>
+              <a:gd name="connsiteY3" fmla="*/ 6858000 h 6858000"/>
+              <a:gd name="connsiteX4" fmla="*/ 690849 w 7281316"/>
+              <a:gd name="connsiteY4" fmla="*/ 6842426 h 6858000"/>
+              <a:gd name="connsiteX5" fmla="*/ 335637 w 7281316"/>
+              <a:gd name="connsiteY5" fmla="*/ 94722 h 6858000"/>
+            </a:gdLst>
+            <a:ahLst/>
+            <a:cxnLst>
+              <a:cxn ang="0">
+                <a:pos x="connsiteX0" y="connsiteY0"/>
+              </a:cxn>
+              <a:cxn ang="0">
+                <a:pos x="connsiteX1" y="connsiteY1"/>
+              </a:cxn>
+              <a:cxn ang="0">
+                <a:pos x="connsiteX2" y="connsiteY2"/>
+              </a:cxn>
+              <a:cxn ang="0">
+                <a:pos x="connsiteX3" y="connsiteY3"/>
+              </a:cxn>
+              <a:cxn ang="0">
+                <a:pos x="connsiteX4" y="connsiteY4"/>
+              </a:cxn>
+              <a:cxn ang="0">
+                <a:pos x="connsiteX5" y="connsiteY5"/>
+              </a:cxn>
+            </a:cxnLst>
+            <a:rect l="l" t="t" r="r" b="b"/>
+            <a:pathLst>
+              <a:path w="7281316" h="6858000">
+                <a:moveTo>
+                  <a:pt x="361354" y="0"/>
+                </a:moveTo>
+                <a:lnTo>
+                  <a:pt x="7281316" y="0"/>
+                </a:lnTo>
+                <a:lnTo>
+                  <a:pt x="7281316" y="6858000"/>
+                </a:lnTo>
+                <a:lnTo>
+                  <a:pt x="696735" y="6858000"/>
+                </a:lnTo>
+                <a:lnTo>
+                  <a:pt x="690849" y="6842426"/>
+                </a:lnTo>
+                <a:cubicBezTo>
+                  <a:pt x="-65870" y="4704140"/>
+                  <a:pt x="-226206" y="2374054"/>
+                  <a:pt x="335637" y="94722"/>
+                </a:cubicBezTo>
+                <a:close/>
+              </a:path>
+            </a:pathLst>
+          </a:custGeom>
+          <a:solidFill>
+            <a:schemeClr val="tx1">
+              <a:alpha val="80000"/>
+            </a:schemeClr>
+          </a:solidFill>
+          <a:ln>
+            <a:noFill/>
+          </a:ln>
+        </p:spPr>
+        <p:style>
+          <a:lnRef idx="2">
+            <a:schemeClr val="accent1">
+              <a:shade val="50000"/>
+            </a:schemeClr>
+          </a:lnRef>
+          <a:fillRef idx="1">
+            <a:schemeClr val="accent1"/>
+          </a:fillRef>
+          <a:effectRef idx="0">
+            <a:schemeClr val="accent1"/>
+          </a:effectRef>
+          <a:fontRef idx="minor">
+            <a:schemeClr val="lt1"/>
+          </a:fontRef>
+        </p:style>
+        <p:txBody>
+          <a:bodyPr rtlCol="0" anchor="ctr"/>
+          <a:lstStyle/>
+          <a:p>
+            <a:pPr algn="ctr"/>
+            <a:endParaRPr lang="en-US"/>
+          </a:p>
+        </p:txBody>
+      </p:sp>
+      <p:sp>
+        <p:nvSpPr>
+          <p:cNvPr id="10" name="Freeform: Shape 9">
+            <a:extLst>
+              <a:ext uri="{FF2B5EF4-FFF2-40B4-BE49-F238E27FC236}">
+                <a16:creationId xmlns:a16="http://schemas.microsoft.com/office/drawing/2014/main" id="{89CC0F1E-BAA2-47B1-8F83-7ECB9FD9E009}"/>
+              </a:ext>
+              <a:ext uri="{C183D7F6-B498-43B3-948B-1728B52AA6E4}">
+                <adec:decorative xmlns:adec="http://schemas.microsoft.com/office/drawing/2017/decorative" val="1"/>
+              </a:ext>
+            </a:extLst>
+          </p:cNvPr>
+          <p:cNvSpPr>
+            <a:spLocks noGrp="1" noRot="1" noChangeAspect="1" noMove="1" noResize="1" noEditPoints="1" noAdjustHandles="1" noChangeArrowheads="1" noChangeShapeType="1" noTextEdit="1"/>
+          </p:cNvSpPr>
+          <p:nvPr>
+            <p:extLst>
+              <p:ext uri="{386F3935-93C4-4BCD-93E2-E3B085C9AB24}">
+                <p16:designElem xmlns:p16="http://schemas.microsoft.com/office/powerpoint/2015/main" val="1"/>
+              </p:ext>
+            </p:extLst>
+          </p:nvPr>
+        </p:nvSpPr>
+        <p:spPr>
+          <a:xfrm>
+            <a:off x="5189558" y="0"/>
+            <a:ext cx="6999394" cy="6858000"/>
+          </a:xfrm>
+          <a:custGeom>
+            <a:avLst/>
+            <a:gdLst>
+              <a:gd name="connsiteX0" fmla="*/ 6999394 w 6999394"/>
+              <a:gd name="connsiteY0" fmla="*/ 0 h 6858000"/>
+              <a:gd name="connsiteX1" fmla="*/ 6999394 w 6999394"/>
+              <a:gd name="connsiteY1" fmla="*/ 6858000 h 6858000"/>
+              <a:gd name="connsiteX2" fmla="*/ 717029 w 6999394"/>
+              <a:gd name="connsiteY2" fmla="*/ 6858000 h 6858000"/>
+              <a:gd name="connsiteX3" fmla="*/ 623642 w 6999394"/>
+              <a:gd name="connsiteY3" fmla="*/ 6599363 h 6858000"/>
+              <a:gd name="connsiteX4" fmla="*/ 319533 w 6999394"/>
+              <a:gd name="connsiteY4" fmla="*/ 193787 h 6858000"/>
+              <a:gd name="connsiteX5" fmla="*/ 371685 w 6999394"/>
+              <a:gd name="connsiteY5" fmla="*/ 1 h 6858000"/>
+            </a:gdLst>
+            <a:ahLst/>
+            <a:cxnLst>
+              <a:cxn ang="0">
+                <a:pos x="connsiteX0" y="connsiteY0"/>
+              </a:cxn>
+              <a:cxn ang="0">
+                <a:pos x="connsiteX1" y="connsiteY1"/>
+              </a:cxn>
+              <a:cxn ang="0">
+                <a:pos x="connsiteX2" y="connsiteY2"/>
+              </a:cxn>
+              <a:cxn ang="0">
+                <a:pos x="connsiteX3" y="connsiteY3"/>
+              </a:cxn>
+              <a:cxn ang="0">
+                <a:pos x="connsiteX4" y="connsiteY4"/>
+              </a:cxn>
+              <a:cxn ang="0">
+                <a:pos x="connsiteX5" y="connsiteY5"/>
+              </a:cxn>
+            </a:cxnLst>
+            <a:rect l="l" t="t" r="r" b="b"/>
+            <a:pathLst>
+              <a:path w="6999394" h="6858000">
+                <a:moveTo>
+                  <a:pt x="6999394" y="0"/>
+                </a:moveTo>
+                <a:lnTo>
+                  <a:pt x="6999394" y="6858000"/>
+                </a:lnTo>
+                <a:lnTo>
+                  <a:pt x="717029" y="6858000"/>
+                </a:lnTo>
+                <a:lnTo>
+                  <a:pt x="623642" y="6599363"/>
+                </a:lnTo>
+                <a:cubicBezTo>
+                  <a:pt x="-67685" y="4563346"/>
+                  <a:pt x="-206622" y="2355719"/>
+                  <a:pt x="319533" y="193787"/>
+                </a:cubicBezTo>
+                <a:lnTo>
+                  <a:pt x="371685" y="1"/>
+                </a:lnTo>
+                <a:close/>
+              </a:path>
+            </a:pathLst>
+          </a:custGeom>
+          <a:solidFill>
+            <a:schemeClr val="bg1">
+              <a:lumMod val="65000"/>
+              <a:lumOff val="35000"/>
+            </a:schemeClr>
+          </a:solidFill>
+          <a:ln>
+            <a:noFill/>
+          </a:ln>
+        </p:spPr>
+        <p:style>
+          <a:lnRef idx="2">
+            <a:schemeClr val="accent1">
+              <a:shade val="50000"/>
+            </a:schemeClr>
+          </a:lnRef>
+          <a:fillRef idx="1">
+            <a:schemeClr val="accent1"/>
+          </a:fillRef>
+          <a:effectRef idx="0">
+            <a:schemeClr val="accent1"/>
+          </a:effectRef>
+          <a:fontRef idx="minor">
+            <a:schemeClr val="lt1"/>
+          </a:fontRef>
+        </p:style>
+        <p:txBody>
+          <a:bodyPr rtlCol="0" anchor="ctr"/>
+          <a:lstStyle/>
+          <a:p>
+            <a:pPr algn="ctr"/>
+            <a:endParaRPr lang="en-US"/>
+          </a:p>
+        </p:txBody>
+      </p:sp>
+      <p:sp>
+        <p:nvSpPr>
+          <p:cNvPr id="2" name="Title 1">
+            <a:extLst>
+              <a:ext uri="{FF2B5EF4-FFF2-40B4-BE49-F238E27FC236}">
+                <a16:creationId xmlns:a16="http://schemas.microsoft.com/office/drawing/2014/main" id="{5FC2DDF4-6363-064F-AF5F-4A69E069E984}"/>
+              </a:ext>
+            </a:extLst>
+          </p:cNvPr>
+          <p:cNvSpPr>
+            <a:spLocks noGrp="1"/>
+          </p:cNvSpPr>
+          <p:nvPr>
+            <p:ph type="title"/>
+          </p:nvPr>
+        </p:nvSpPr>
+        <p:spPr>
+          <a:xfrm>
+            <a:off x="6096000" y="1240714"/>
+            <a:ext cx="5600700" cy="4376572"/>
+          </a:xfrm>
+        </p:spPr>
+        <p:txBody>
+          <a:bodyPr anchor="ctr">
+            <a:normAutofit/>
+          </a:bodyPr>
+          <a:lstStyle/>
+          <a:p>
+            <a:pPr algn="ctr"/>
+            <a:r>
+              <a:rPr lang="en-TW" sz="5000" dirty="0"/>
+              <a:t>Introduction to </a:t>
+            </a:r>
+            <a:br>
+              <a:rPr lang="en-TW" sz="5000" dirty="0"/>
+            </a:br>
+            <a:r>
+              <a:rPr lang="en-TW" sz="5000" dirty="0"/>
+              <a:t>Tabu Search</a:t>
+            </a:r>
+          </a:p>
+        </p:txBody>
+      </p:sp>
+    </p:spTree>
+    <p:extLst>
+      <p:ext uri="{BB962C8B-B14F-4D97-AF65-F5344CB8AC3E}">
+        <p14:creationId xmlns:p14="http://schemas.microsoft.com/office/powerpoint/2010/main" val="319381841"/>
+      </p:ext>
+    </p:extLst>
+  </p:cSld>
+  <p:clrMapOvr>
+    <a:overrideClrMapping bg1="dk1" tx1="lt1" bg2="dk2" tx2="lt2" accent1="accent1" accent2="accent2" accent3="accent3" accent4="accent4" accent5="accent5" accent6="accent6" hlink="hlink" folHlink="folHlink"/>
+  </p:clrMapOvr>
+</p:sld>
+</file>
+
+<file path=ppt/slides/slide30.xml><?xml version="1.0" encoding="utf-8"?>
 <p:sld xmlns:a="http://schemas.openxmlformats.org/drawingml/2006/main" xmlns:r="http://schemas.openxmlformats.org/officeDocument/2006/relationships" xmlns:p="http://schemas.openxmlformats.org/presentationml/2006/main">
   <p:cSld>
     <p:bg>
@@ -12754,7 +13614,7 @@
 </p:sld>
 </file>
 
-<file path=ppt/slides/slide26.xml><?xml version="1.0" encoding="utf-8"?>
+<file path=ppt/slides/slide31.xml><?xml version="1.0" encoding="utf-8"?>
 <p:sld xmlns:a="http://schemas.openxmlformats.org/drawingml/2006/main" xmlns:r="http://schemas.openxmlformats.org/officeDocument/2006/relationships" xmlns:p="http://schemas.openxmlformats.org/presentationml/2006/main">
   <p:cSld>
     <p:bg>
@@ -13255,7 +14115,7 @@
 </p:sld>
 </file>
 
-<file path=ppt/slides/slide27.xml><?xml version="1.0" encoding="utf-8"?>
+<file path=ppt/slides/slide32.xml><?xml version="1.0" encoding="utf-8"?>
 <p:sld xmlns:a="http://schemas.openxmlformats.org/drawingml/2006/main" xmlns:r="http://schemas.openxmlformats.org/officeDocument/2006/relationships" xmlns:p="http://schemas.openxmlformats.org/presentationml/2006/main">
   <p:cSld>
     <p:bg>
@@ -13541,7 +14401,7 @@
 </p:sld>
 </file>
 
-<file path=ppt/slides/slide28.xml><?xml version="1.0" encoding="utf-8"?>
+<file path=ppt/slides/slide33.xml><?xml version="1.0" encoding="utf-8"?>
 <p:sld xmlns:a="http://schemas.openxmlformats.org/drawingml/2006/main" xmlns:r="http://schemas.openxmlformats.org/officeDocument/2006/relationships" xmlns:p="http://schemas.openxmlformats.org/presentationml/2006/main">
   <p:cSld>
     <p:bg>
@@ -13883,7 +14743,7 @@
 </p:sld>
 </file>
 
-<file path=ppt/slides/slide29.xml><?xml version="1.0" encoding="utf-8"?>
+<file path=ppt/slides/slide34.xml><?xml version="1.0" encoding="utf-8"?>
 <p:sld xmlns:a="http://schemas.openxmlformats.org/drawingml/2006/main" xmlns:r="http://schemas.openxmlformats.org/officeDocument/2006/relationships" xmlns:p="http://schemas.openxmlformats.org/presentationml/2006/main">
   <p:cSld>
     <p:spTree>
@@ -13966,344 +14826,7 @@
 </p:sld>
 </file>
 
-<file path=ppt/slides/slide3.xml><?xml version="1.0" encoding="utf-8"?>
-<p:sld xmlns:a="http://schemas.openxmlformats.org/drawingml/2006/main" xmlns:r="http://schemas.openxmlformats.org/officeDocument/2006/relationships" xmlns:p="http://schemas.openxmlformats.org/presentationml/2006/main">
-  <p:cSld>
-    <p:bg>
-      <p:bgPr>
-        <a:solidFill>
-          <a:schemeClr val="bg1">
-            <a:tint val="95000"/>
-            <a:satMod val="170000"/>
-          </a:schemeClr>
-        </a:solidFill>
-        <a:effectLst/>
-      </p:bgPr>
-    </p:bg>
-    <p:spTree>
-      <p:nvGrpSpPr>
-        <p:cNvPr id="1" name=""/>
-        <p:cNvGrpSpPr/>
-        <p:nvPr/>
-      </p:nvGrpSpPr>
-      <p:grpSpPr>
-        <a:xfrm>
-          <a:off x="0" y="0"/>
-          <a:ext cx="0" cy="0"/>
-          <a:chOff x="0" y="0"/>
-          <a:chExt cx="0" cy="0"/>
-        </a:xfrm>
-      </p:grpSpPr>
-      <p:sp>
-        <p:nvSpPr>
-          <p:cNvPr id="8" name="Freeform: Shape 7">
-            <a:extLst>
-              <a:ext uri="{FF2B5EF4-FFF2-40B4-BE49-F238E27FC236}">
-                <a16:creationId xmlns:a16="http://schemas.microsoft.com/office/drawing/2014/main" id="{DFF2AC85-FAA0-4844-813F-83C04D7382E2}"/>
-              </a:ext>
-              <a:ext uri="{C183D7F6-B498-43B3-948B-1728B52AA6E4}">
-                <adec:decorative xmlns:adec="http://schemas.microsoft.com/office/drawing/2017/decorative" val="1"/>
-              </a:ext>
-            </a:extLst>
-          </p:cNvPr>
-          <p:cNvSpPr>
-            <a:spLocks noGrp="1" noRot="1" noChangeAspect="1" noMove="1" noResize="1" noEditPoints="1" noAdjustHandles="1" noChangeArrowheads="1" noChangeShapeType="1" noTextEdit="1"/>
-          </p:cNvSpPr>
-          <p:nvPr>
-            <p:extLst>
-              <p:ext uri="{386F3935-93C4-4BCD-93E2-E3B085C9AB24}">
-                <p16:designElem xmlns:p16="http://schemas.microsoft.com/office/powerpoint/2015/main" val="1"/>
-              </p:ext>
-            </p:extLst>
-          </p:nvPr>
-        </p:nvSpPr>
-        <p:spPr>
-          <a:xfrm>
-            <a:off x="4907636" y="0"/>
-            <a:ext cx="7281316" cy="6858000"/>
-          </a:xfrm>
-          <a:custGeom>
-            <a:avLst/>
-            <a:gdLst>
-              <a:gd name="connsiteX0" fmla="*/ 361354 w 7281316"/>
-              <a:gd name="connsiteY0" fmla="*/ 0 h 6858000"/>
-              <a:gd name="connsiteX1" fmla="*/ 7281316 w 7281316"/>
-              <a:gd name="connsiteY1" fmla="*/ 0 h 6858000"/>
-              <a:gd name="connsiteX2" fmla="*/ 7281316 w 7281316"/>
-              <a:gd name="connsiteY2" fmla="*/ 6858000 h 6858000"/>
-              <a:gd name="connsiteX3" fmla="*/ 696735 w 7281316"/>
-              <a:gd name="connsiteY3" fmla="*/ 6858000 h 6858000"/>
-              <a:gd name="connsiteX4" fmla="*/ 690849 w 7281316"/>
-              <a:gd name="connsiteY4" fmla="*/ 6842426 h 6858000"/>
-              <a:gd name="connsiteX5" fmla="*/ 335637 w 7281316"/>
-              <a:gd name="connsiteY5" fmla="*/ 94722 h 6858000"/>
-            </a:gdLst>
-            <a:ahLst/>
-            <a:cxnLst>
-              <a:cxn ang="0">
-                <a:pos x="connsiteX0" y="connsiteY0"/>
-              </a:cxn>
-              <a:cxn ang="0">
-                <a:pos x="connsiteX1" y="connsiteY1"/>
-              </a:cxn>
-              <a:cxn ang="0">
-                <a:pos x="connsiteX2" y="connsiteY2"/>
-              </a:cxn>
-              <a:cxn ang="0">
-                <a:pos x="connsiteX3" y="connsiteY3"/>
-              </a:cxn>
-              <a:cxn ang="0">
-                <a:pos x="connsiteX4" y="connsiteY4"/>
-              </a:cxn>
-              <a:cxn ang="0">
-                <a:pos x="connsiteX5" y="connsiteY5"/>
-              </a:cxn>
-            </a:cxnLst>
-            <a:rect l="l" t="t" r="r" b="b"/>
-            <a:pathLst>
-              <a:path w="7281316" h="6858000">
-                <a:moveTo>
-                  <a:pt x="361354" y="0"/>
-                </a:moveTo>
-                <a:lnTo>
-                  <a:pt x="7281316" y="0"/>
-                </a:lnTo>
-                <a:lnTo>
-                  <a:pt x="7281316" y="6858000"/>
-                </a:lnTo>
-                <a:lnTo>
-                  <a:pt x="696735" y="6858000"/>
-                </a:lnTo>
-                <a:lnTo>
-                  <a:pt x="690849" y="6842426"/>
-                </a:lnTo>
-                <a:cubicBezTo>
-                  <a:pt x="-65870" y="4704140"/>
-                  <a:pt x="-226206" y="2374054"/>
-                  <a:pt x="335637" y="94722"/>
-                </a:cubicBezTo>
-                <a:close/>
-              </a:path>
-            </a:pathLst>
-          </a:custGeom>
-          <a:solidFill>
-            <a:schemeClr val="tx1">
-              <a:alpha val="80000"/>
-            </a:schemeClr>
-          </a:solidFill>
-          <a:ln>
-            <a:noFill/>
-          </a:ln>
-        </p:spPr>
-        <p:style>
-          <a:lnRef idx="2">
-            <a:schemeClr val="accent1">
-              <a:shade val="50000"/>
-            </a:schemeClr>
-          </a:lnRef>
-          <a:fillRef idx="1">
-            <a:schemeClr val="accent1"/>
-          </a:fillRef>
-          <a:effectRef idx="0">
-            <a:schemeClr val="accent1"/>
-          </a:effectRef>
-          <a:fontRef idx="minor">
-            <a:schemeClr val="lt1"/>
-          </a:fontRef>
-        </p:style>
-        <p:txBody>
-          <a:bodyPr rtlCol="0" anchor="ctr"/>
-          <a:lstStyle/>
-          <a:p>
-            <a:pPr algn="ctr"/>
-            <a:endParaRPr lang="en-US"/>
-          </a:p>
-        </p:txBody>
-      </p:sp>
-      <p:sp>
-        <p:nvSpPr>
-          <p:cNvPr id="10" name="Freeform: Shape 9">
-            <a:extLst>
-              <a:ext uri="{FF2B5EF4-FFF2-40B4-BE49-F238E27FC236}">
-                <a16:creationId xmlns:a16="http://schemas.microsoft.com/office/drawing/2014/main" id="{89CC0F1E-BAA2-47B1-8F83-7ECB9FD9E009}"/>
-              </a:ext>
-              <a:ext uri="{C183D7F6-B498-43B3-948B-1728B52AA6E4}">
-                <adec:decorative xmlns:adec="http://schemas.microsoft.com/office/drawing/2017/decorative" val="1"/>
-              </a:ext>
-            </a:extLst>
-          </p:cNvPr>
-          <p:cNvSpPr>
-            <a:spLocks noGrp="1" noRot="1" noChangeAspect="1" noMove="1" noResize="1" noEditPoints="1" noAdjustHandles="1" noChangeArrowheads="1" noChangeShapeType="1" noTextEdit="1"/>
-          </p:cNvSpPr>
-          <p:nvPr>
-            <p:extLst>
-              <p:ext uri="{386F3935-93C4-4BCD-93E2-E3B085C9AB24}">
-                <p16:designElem xmlns:p16="http://schemas.microsoft.com/office/powerpoint/2015/main" val="1"/>
-              </p:ext>
-            </p:extLst>
-          </p:nvPr>
-        </p:nvSpPr>
-        <p:spPr>
-          <a:xfrm>
-            <a:off x="5189558" y="0"/>
-            <a:ext cx="6999394" cy="6858000"/>
-          </a:xfrm>
-          <a:custGeom>
-            <a:avLst/>
-            <a:gdLst>
-              <a:gd name="connsiteX0" fmla="*/ 6999394 w 6999394"/>
-              <a:gd name="connsiteY0" fmla="*/ 0 h 6858000"/>
-              <a:gd name="connsiteX1" fmla="*/ 6999394 w 6999394"/>
-              <a:gd name="connsiteY1" fmla="*/ 6858000 h 6858000"/>
-              <a:gd name="connsiteX2" fmla="*/ 717029 w 6999394"/>
-              <a:gd name="connsiteY2" fmla="*/ 6858000 h 6858000"/>
-              <a:gd name="connsiteX3" fmla="*/ 623642 w 6999394"/>
-              <a:gd name="connsiteY3" fmla="*/ 6599363 h 6858000"/>
-              <a:gd name="connsiteX4" fmla="*/ 319533 w 6999394"/>
-              <a:gd name="connsiteY4" fmla="*/ 193787 h 6858000"/>
-              <a:gd name="connsiteX5" fmla="*/ 371685 w 6999394"/>
-              <a:gd name="connsiteY5" fmla="*/ 1 h 6858000"/>
-            </a:gdLst>
-            <a:ahLst/>
-            <a:cxnLst>
-              <a:cxn ang="0">
-                <a:pos x="connsiteX0" y="connsiteY0"/>
-              </a:cxn>
-              <a:cxn ang="0">
-                <a:pos x="connsiteX1" y="connsiteY1"/>
-              </a:cxn>
-              <a:cxn ang="0">
-                <a:pos x="connsiteX2" y="connsiteY2"/>
-              </a:cxn>
-              <a:cxn ang="0">
-                <a:pos x="connsiteX3" y="connsiteY3"/>
-              </a:cxn>
-              <a:cxn ang="0">
-                <a:pos x="connsiteX4" y="connsiteY4"/>
-              </a:cxn>
-              <a:cxn ang="0">
-                <a:pos x="connsiteX5" y="connsiteY5"/>
-              </a:cxn>
-            </a:cxnLst>
-            <a:rect l="l" t="t" r="r" b="b"/>
-            <a:pathLst>
-              <a:path w="6999394" h="6858000">
-                <a:moveTo>
-                  <a:pt x="6999394" y="0"/>
-                </a:moveTo>
-                <a:lnTo>
-                  <a:pt x="6999394" y="6858000"/>
-                </a:lnTo>
-                <a:lnTo>
-                  <a:pt x="717029" y="6858000"/>
-                </a:lnTo>
-                <a:lnTo>
-                  <a:pt x="623642" y="6599363"/>
-                </a:lnTo>
-                <a:cubicBezTo>
-                  <a:pt x="-67685" y="4563346"/>
-                  <a:pt x="-206622" y="2355719"/>
-                  <a:pt x="319533" y="193787"/>
-                </a:cubicBezTo>
-                <a:lnTo>
-                  <a:pt x="371685" y="1"/>
-                </a:lnTo>
-                <a:close/>
-              </a:path>
-            </a:pathLst>
-          </a:custGeom>
-          <a:solidFill>
-            <a:schemeClr val="bg1">
-              <a:lumMod val="65000"/>
-              <a:lumOff val="35000"/>
-            </a:schemeClr>
-          </a:solidFill>
-          <a:ln>
-            <a:noFill/>
-          </a:ln>
-        </p:spPr>
-        <p:style>
-          <a:lnRef idx="2">
-            <a:schemeClr val="accent1">
-              <a:shade val="50000"/>
-            </a:schemeClr>
-          </a:lnRef>
-          <a:fillRef idx="1">
-            <a:schemeClr val="accent1"/>
-          </a:fillRef>
-          <a:effectRef idx="0">
-            <a:schemeClr val="accent1"/>
-          </a:effectRef>
-          <a:fontRef idx="minor">
-            <a:schemeClr val="lt1"/>
-          </a:fontRef>
-        </p:style>
-        <p:txBody>
-          <a:bodyPr rtlCol="0" anchor="ctr"/>
-          <a:lstStyle/>
-          <a:p>
-            <a:pPr algn="ctr"/>
-            <a:endParaRPr lang="en-US"/>
-          </a:p>
-        </p:txBody>
-      </p:sp>
-      <p:sp>
-        <p:nvSpPr>
-          <p:cNvPr id="2" name="Title 1">
-            <a:extLst>
-              <a:ext uri="{FF2B5EF4-FFF2-40B4-BE49-F238E27FC236}">
-                <a16:creationId xmlns:a16="http://schemas.microsoft.com/office/drawing/2014/main" id="{5FC2DDF4-6363-064F-AF5F-4A69E069E984}"/>
-              </a:ext>
-            </a:extLst>
-          </p:cNvPr>
-          <p:cNvSpPr>
-            <a:spLocks noGrp="1"/>
-          </p:cNvSpPr>
-          <p:nvPr>
-            <p:ph type="title"/>
-          </p:nvPr>
-        </p:nvSpPr>
-        <p:spPr>
-          <a:xfrm>
-            <a:off x="6096000" y="1240714"/>
-            <a:ext cx="5600700" cy="4376572"/>
-          </a:xfrm>
-        </p:spPr>
-        <p:txBody>
-          <a:bodyPr anchor="ctr">
-            <a:normAutofit/>
-          </a:bodyPr>
-          <a:lstStyle/>
-          <a:p>
-            <a:pPr algn="ctr"/>
-            <a:r>
-              <a:rPr lang="en-TW" sz="5000" dirty="0"/>
-              <a:t>Introduction to </a:t>
-            </a:r>
-            <a:br>
-              <a:rPr lang="en-TW" sz="5000" dirty="0"/>
-            </a:br>
-            <a:r>
-              <a:rPr lang="en-TW" sz="5000" dirty="0"/>
-              <a:t>Tabu Search</a:t>
-            </a:r>
-          </a:p>
-        </p:txBody>
-      </p:sp>
-    </p:spTree>
-    <p:extLst>
-      <p:ext uri="{BB962C8B-B14F-4D97-AF65-F5344CB8AC3E}">
-        <p14:creationId xmlns:p14="http://schemas.microsoft.com/office/powerpoint/2010/main" val="319381841"/>
-      </p:ext>
-    </p:extLst>
-  </p:cSld>
-  <p:clrMapOvr>
-    <a:overrideClrMapping bg1="dk1" tx1="lt1" bg2="dk2" tx2="lt2" accent1="accent1" accent2="accent2" accent3="accent3" accent4="accent4" accent5="accent5" accent6="accent6" hlink="hlink" folHlink="folHlink"/>
-  </p:clrMapOvr>
-</p:sld>
-</file>
-
-<file path=ppt/slides/slide30.xml><?xml version="1.0" encoding="utf-8"?>
+<file path=ppt/slides/slide35.xml><?xml version="1.0" encoding="utf-8"?>
 <p:sld xmlns:a="http://schemas.openxmlformats.org/drawingml/2006/main" xmlns:r="http://schemas.openxmlformats.org/officeDocument/2006/relationships" xmlns:p="http://schemas.openxmlformats.org/presentationml/2006/main">
   <p:cSld>
     <p:spTree>

</xml_diff>